<commit_message>
MCD + min height admin panel
</commit_message>
<xml_diff>
--- a/MCD.pptx
+++ b/MCD.pptx
@@ -259,7 +259,7 @@
           <a:p>
             <a:fld id="{1D3AB131-0760-4F5D-A754-5C3545B65AAD}" type="datetimeFigureOut">
               <a:rPr lang="fr-FR" smtClean="0"/>
-              <a:t>27/11/2021</a:t>
+              <a:t>29/11/2021</a:t>
             </a:fld>
             <a:endParaRPr lang="fr-FR"/>
           </a:p>
@@ -457,7 +457,7 @@
           <a:p>
             <a:fld id="{1D3AB131-0760-4F5D-A754-5C3545B65AAD}" type="datetimeFigureOut">
               <a:rPr lang="fr-FR" smtClean="0"/>
-              <a:t>27/11/2021</a:t>
+              <a:t>29/11/2021</a:t>
             </a:fld>
             <a:endParaRPr lang="fr-FR"/>
           </a:p>
@@ -665,7 +665,7 @@
           <a:p>
             <a:fld id="{1D3AB131-0760-4F5D-A754-5C3545B65AAD}" type="datetimeFigureOut">
               <a:rPr lang="fr-FR" smtClean="0"/>
-              <a:t>27/11/2021</a:t>
+              <a:t>29/11/2021</a:t>
             </a:fld>
             <a:endParaRPr lang="fr-FR"/>
           </a:p>
@@ -863,7 +863,7 @@
           <a:p>
             <a:fld id="{1D3AB131-0760-4F5D-A754-5C3545B65AAD}" type="datetimeFigureOut">
               <a:rPr lang="fr-FR" smtClean="0"/>
-              <a:t>27/11/2021</a:t>
+              <a:t>29/11/2021</a:t>
             </a:fld>
             <a:endParaRPr lang="fr-FR"/>
           </a:p>
@@ -1138,7 +1138,7 @@
           <a:p>
             <a:fld id="{1D3AB131-0760-4F5D-A754-5C3545B65AAD}" type="datetimeFigureOut">
               <a:rPr lang="fr-FR" smtClean="0"/>
-              <a:t>27/11/2021</a:t>
+              <a:t>29/11/2021</a:t>
             </a:fld>
             <a:endParaRPr lang="fr-FR"/>
           </a:p>
@@ -1403,7 +1403,7 @@
           <a:p>
             <a:fld id="{1D3AB131-0760-4F5D-A754-5C3545B65AAD}" type="datetimeFigureOut">
               <a:rPr lang="fr-FR" smtClean="0"/>
-              <a:t>27/11/2021</a:t>
+              <a:t>29/11/2021</a:t>
             </a:fld>
             <a:endParaRPr lang="fr-FR"/>
           </a:p>
@@ -1815,7 +1815,7 @@
           <a:p>
             <a:fld id="{1D3AB131-0760-4F5D-A754-5C3545B65AAD}" type="datetimeFigureOut">
               <a:rPr lang="fr-FR" smtClean="0"/>
-              <a:t>27/11/2021</a:t>
+              <a:t>29/11/2021</a:t>
             </a:fld>
             <a:endParaRPr lang="fr-FR"/>
           </a:p>
@@ -1956,7 +1956,7 @@
           <a:p>
             <a:fld id="{1D3AB131-0760-4F5D-A754-5C3545B65AAD}" type="datetimeFigureOut">
               <a:rPr lang="fr-FR" smtClean="0"/>
-              <a:t>27/11/2021</a:t>
+              <a:t>29/11/2021</a:t>
             </a:fld>
             <a:endParaRPr lang="fr-FR"/>
           </a:p>
@@ -2069,7 +2069,7 @@
           <a:p>
             <a:fld id="{1D3AB131-0760-4F5D-A754-5C3545B65AAD}" type="datetimeFigureOut">
               <a:rPr lang="fr-FR" smtClean="0"/>
-              <a:t>27/11/2021</a:t>
+              <a:t>29/11/2021</a:t>
             </a:fld>
             <a:endParaRPr lang="fr-FR"/>
           </a:p>
@@ -2380,7 +2380,7 @@
           <a:p>
             <a:fld id="{1D3AB131-0760-4F5D-A754-5C3545B65AAD}" type="datetimeFigureOut">
               <a:rPr lang="fr-FR" smtClean="0"/>
-              <a:t>27/11/2021</a:t>
+              <a:t>29/11/2021</a:t>
             </a:fld>
             <a:endParaRPr lang="fr-FR"/>
           </a:p>
@@ -2668,7 +2668,7 @@
           <a:p>
             <a:fld id="{1D3AB131-0760-4F5D-A754-5C3545B65AAD}" type="datetimeFigureOut">
               <a:rPr lang="fr-FR" smtClean="0"/>
-              <a:t>27/11/2021</a:t>
+              <a:t>29/11/2021</a:t>
             </a:fld>
             <a:endParaRPr lang="fr-FR"/>
           </a:p>
@@ -2909,7 +2909,7 @@
           <a:p>
             <a:fld id="{1D3AB131-0760-4F5D-A754-5C3545B65AAD}" type="datetimeFigureOut">
               <a:rPr lang="fr-FR" smtClean="0"/>
-              <a:t>27/11/2021</a:t>
+              <a:t>29/11/2021</a:t>
             </a:fld>
             <a:endParaRPr lang="fr-FR"/>
           </a:p>
@@ -3483,7 +3483,7 @@
         <p:grpSpPr>
           <a:xfrm>
             <a:off x="1035132" y="403764"/>
-            <a:ext cx="1757548" cy="1725878"/>
+            <a:ext cx="1757548" cy="1937100"/>
             <a:chOff x="1349828" y="180110"/>
             <a:chExt cx="1757548" cy="1725878"/>
           </a:xfrm>
@@ -3658,185 +3658,6 @@
                 </a:solidFill>
               </a:endParaRPr>
             </a:p>
-          </p:txBody>
-        </p:sp>
-      </p:grpSp>
-      <p:grpSp>
-        <p:nvGrpSpPr>
-          <p:cNvPr id="14" name="Groupe 13">
-            <a:extLst>
-              <a:ext uri="{FF2B5EF4-FFF2-40B4-BE49-F238E27FC236}">
-                <a16:creationId xmlns:a16="http://schemas.microsoft.com/office/drawing/2014/main" id="{102D6D43-C9A6-431F-8282-AB60ACBEF247}"/>
-              </a:ext>
-            </a:extLst>
-          </p:cNvPr>
-          <p:cNvGrpSpPr/>
-          <p:nvPr/>
-        </p:nvGrpSpPr>
-        <p:grpSpPr>
-          <a:xfrm>
-            <a:off x="4082143" y="403764"/>
-            <a:ext cx="1757548" cy="1725878"/>
-            <a:chOff x="1349828" y="180110"/>
-            <a:chExt cx="1757548" cy="1725878"/>
-          </a:xfrm>
-        </p:grpSpPr>
-        <p:sp>
-          <p:nvSpPr>
-            <p:cNvPr id="15" name="Rectangle 14">
-              <a:extLst>
-                <a:ext uri="{FF2B5EF4-FFF2-40B4-BE49-F238E27FC236}">
-                  <a16:creationId xmlns:a16="http://schemas.microsoft.com/office/drawing/2014/main" id="{7C24131F-4BC9-4A60-AE80-D4EA0EA0610C}"/>
-                </a:ext>
-              </a:extLst>
-            </p:cNvPr>
-            <p:cNvSpPr/>
-            <p:nvPr/>
-          </p:nvSpPr>
-          <p:spPr>
-            <a:xfrm>
-              <a:off x="1349828" y="180110"/>
-              <a:ext cx="1757548" cy="275112"/>
-            </a:xfrm>
-            <a:prstGeom prst="rect">
-              <a:avLst/>
-            </a:prstGeom>
-            <a:solidFill>
-              <a:schemeClr val="bg1"/>
-            </a:solidFill>
-            <a:ln>
-              <a:solidFill>
-                <a:schemeClr val="tx1"/>
-              </a:solidFill>
-            </a:ln>
-          </p:spPr>
-          <p:style>
-            <a:lnRef idx="2">
-              <a:schemeClr val="accent1">
-                <a:shade val="50000"/>
-              </a:schemeClr>
-            </a:lnRef>
-            <a:fillRef idx="1">
-              <a:schemeClr val="accent1"/>
-            </a:fillRef>
-            <a:effectRef idx="0">
-              <a:schemeClr val="accent1"/>
-            </a:effectRef>
-            <a:fontRef idx="minor">
-              <a:schemeClr val="lt1"/>
-            </a:fontRef>
-          </p:style>
-          <p:txBody>
-            <a:bodyPr rtlCol="0" anchor="ctr"/>
-            <a:lstStyle/>
-            <a:p>
-              <a:pPr algn="ctr"/>
-              <a:r>
-                <a:rPr lang="fr-FR" dirty="0" err="1">
-                  <a:solidFill>
-                    <a:schemeClr val="tx1"/>
-                  </a:solidFill>
-                </a:rPr>
-                <a:t>deleted_users</a:t>
-              </a:r>
-              <a:endParaRPr lang="fr-FR" dirty="0">
-                <a:solidFill>
-                  <a:schemeClr val="tx1"/>
-                </a:solidFill>
-              </a:endParaRPr>
-            </a:p>
-          </p:txBody>
-        </p:sp>
-        <p:sp>
-          <p:nvSpPr>
-            <p:cNvPr id="20" name="Rectangle 19">
-              <a:extLst>
-                <a:ext uri="{FF2B5EF4-FFF2-40B4-BE49-F238E27FC236}">
-                  <a16:creationId xmlns:a16="http://schemas.microsoft.com/office/drawing/2014/main" id="{09341017-B98A-47D9-A545-926F451EE920}"/>
-                </a:ext>
-              </a:extLst>
-            </p:cNvPr>
-            <p:cNvSpPr/>
-            <p:nvPr/>
-          </p:nvSpPr>
-          <p:spPr>
-            <a:xfrm>
-              <a:off x="1349828" y="459179"/>
-              <a:ext cx="1757548" cy="1446809"/>
-            </a:xfrm>
-            <a:prstGeom prst="rect">
-              <a:avLst/>
-            </a:prstGeom>
-            <a:solidFill>
-              <a:schemeClr val="bg1"/>
-            </a:solidFill>
-            <a:ln>
-              <a:solidFill>
-                <a:schemeClr val="tx1"/>
-              </a:solidFill>
-            </a:ln>
-          </p:spPr>
-          <p:style>
-            <a:lnRef idx="2">
-              <a:schemeClr val="accent1">
-                <a:shade val="50000"/>
-              </a:schemeClr>
-            </a:lnRef>
-            <a:fillRef idx="1">
-              <a:schemeClr val="accent1"/>
-            </a:fillRef>
-            <a:effectRef idx="0">
-              <a:schemeClr val="accent1"/>
-            </a:effectRef>
-            <a:fontRef idx="minor">
-              <a:schemeClr val="lt1"/>
-            </a:fontRef>
-          </p:style>
-          <p:txBody>
-            <a:bodyPr rtlCol="0" anchor="ctr"/>
-            <a:lstStyle/>
-            <a:p>
-              <a:pPr marL="285750" indent="-285750">
-                <a:buFontTx/>
-                <a:buChar char="-"/>
-              </a:pPr>
-              <a:r>
-                <a:rPr lang="fr-FR" u="sng" dirty="0">
-                  <a:solidFill>
-                    <a:schemeClr val="tx1"/>
-                  </a:solidFill>
-                </a:rPr>
-                <a:t>login</a:t>
-              </a:r>
-            </a:p>
-            <a:p>
-              <a:pPr marL="285750" indent="-285750">
-                <a:buFontTx/>
-                <a:buChar char="-"/>
-              </a:pPr>
-              <a:r>
-                <a:rPr lang="fr-FR" dirty="0">
-                  <a:solidFill>
-                    <a:schemeClr val="tx1"/>
-                  </a:solidFill>
-                </a:rPr>
-                <a:t>email</a:t>
-              </a:r>
-            </a:p>
-            <a:p>
-              <a:pPr marL="285750" indent="-285750">
-                <a:buFontTx/>
-                <a:buChar char="-"/>
-              </a:pPr>
-              <a:r>
-                <a:rPr lang="fr-FR" dirty="0">
-                  <a:solidFill>
-                    <a:schemeClr val="tx1"/>
-                  </a:solidFill>
-                </a:rPr>
-                <a:t>password</a:t>
-              </a:r>
-            </a:p>
             <a:p>
               <a:pPr marL="285750" indent="-285750">
                 <a:buFontTx/>
@@ -3848,7 +3669,7 @@
                     <a:schemeClr val="tx1"/>
                   </a:solidFill>
                 </a:rPr>
-                <a:t>is_admin</a:t>
+                <a:t>is_disabled</a:t>
               </a:r>
               <a:endParaRPr lang="fr-FR" dirty="0">
                 <a:solidFill>
@@ -4050,7 +3871,9 @@
             <a:ext cx="1423060" cy="539543"/>
           </a:xfrm>
           <a:prstGeom prst="bentConnector3">
-            <a:avLst/>
+            <a:avLst>
+              <a:gd name="adj1" fmla="val 45716"/>
+            </a:avLst>
           </a:prstGeom>
           <a:ln w="12700">
             <a:solidFill>
@@ -4749,6 +4572,209 @@
           </a:p>
         </p:txBody>
       </p:sp>
+      <p:grpSp>
+        <p:nvGrpSpPr>
+          <p:cNvPr id="28" name="Groupe 27">
+            <a:extLst>
+              <a:ext uri="{FF2B5EF4-FFF2-40B4-BE49-F238E27FC236}">
+                <a16:creationId xmlns:a16="http://schemas.microsoft.com/office/drawing/2014/main" id="{3659385F-4C49-4332-8900-4DF1D34AACCB}"/>
+              </a:ext>
+            </a:extLst>
+          </p:cNvPr>
+          <p:cNvGrpSpPr/>
+          <p:nvPr/>
+        </p:nvGrpSpPr>
+        <p:grpSpPr>
+          <a:xfrm>
+            <a:off x="3914786" y="403764"/>
+            <a:ext cx="2306465" cy="1937100"/>
+            <a:chOff x="1349828" y="180110"/>
+            <a:chExt cx="1757548" cy="1725878"/>
+          </a:xfrm>
+        </p:grpSpPr>
+        <p:sp>
+          <p:nvSpPr>
+            <p:cNvPr id="29" name="Rectangle 28">
+              <a:extLst>
+                <a:ext uri="{FF2B5EF4-FFF2-40B4-BE49-F238E27FC236}">
+                  <a16:creationId xmlns:a16="http://schemas.microsoft.com/office/drawing/2014/main" id="{4C61142B-EA12-429F-8062-B2E6C5E359FF}"/>
+                </a:ext>
+              </a:extLst>
+            </p:cNvPr>
+            <p:cNvSpPr/>
+            <p:nvPr/>
+          </p:nvSpPr>
+          <p:spPr>
+            <a:xfrm>
+              <a:off x="1349828" y="180110"/>
+              <a:ext cx="1757548" cy="275112"/>
+            </a:xfrm>
+            <a:prstGeom prst="rect">
+              <a:avLst/>
+            </a:prstGeom>
+            <a:solidFill>
+              <a:schemeClr val="bg1"/>
+            </a:solidFill>
+            <a:ln>
+              <a:solidFill>
+                <a:schemeClr val="tx1"/>
+              </a:solidFill>
+            </a:ln>
+          </p:spPr>
+          <p:style>
+            <a:lnRef idx="2">
+              <a:schemeClr val="accent1">
+                <a:shade val="50000"/>
+              </a:schemeClr>
+            </a:lnRef>
+            <a:fillRef idx="1">
+              <a:schemeClr val="accent1"/>
+            </a:fillRef>
+            <a:effectRef idx="0">
+              <a:schemeClr val="accent1"/>
+            </a:effectRef>
+            <a:fontRef idx="minor">
+              <a:schemeClr val="lt1"/>
+            </a:fontRef>
+          </p:style>
+          <p:txBody>
+            <a:bodyPr rtlCol="0" anchor="ctr"/>
+            <a:lstStyle/>
+            <a:p>
+              <a:pPr algn="ctr"/>
+              <a:r>
+                <a:rPr lang="fr-FR" dirty="0" err="1">
+                  <a:solidFill>
+                    <a:schemeClr val="tx1"/>
+                  </a:solidFill>
+                </a:rPr>
+                <a:t>main_page</a:t>
+              </a:r>
+              <a:endParaRPr lang="fr-FR" dirty="0">
+                <a:solidFill>
+                  <a:schemeClr val="tx1"/>
+                </a:solidFill>
+              </a:endParaRPr>
+            </a:p>
+          </p:txBody>
+        </p:sp>
+        <p:sp>
+          <p:nvSpPr>
+            <p:cNvPr id="30" name="Rectangle 29">
+              <a:extLst>
+                <a:ext uri="{FF2B5EF4-FFF2-40B4-BE49-F238E27FC236}">
+                  <a16:creationId xmlns:a16="http://schemas.microsoft.com/office/drawing/2014/main" id="{49E66159-09B1-46E7-B589-2506BCD12445}"/>
+                </a:ext>
+              </a:extLst>
+            </p:cNvPr>
+            <p:cNvSpPr/>
+            <p:nvPr/>
+          </p:nvSpPr>
+          <p:spPr>
+            <a:xfrm>
+              <a:off x="1349828" y="459179"/>
+              <a:ext cx="1757548" cy="1446809"/>
+            </a:xfrm>
+            <a:prstGeom prst="rect">
+              <a:avLst/>
+            </a:prstGeom>
+            <a:solidFill>
+              <a:schemeClr val="bg1"/>
+            </a:solidFill>
+            <a:ln>
+              <a:solidFill>
+                <a:schemeClr val="tx1"/>
+              </a:solidFill>
+            </a:ln>
+          </p:spPr>
+          <p:style>
+            <a:lnRef idx="2">
+              <a:schemeClr val="accent1">
+                <a:shade val="50000"/>
+              </a:schemeClr>
+            </a:lnRef>
+            <a:fillRef idx="1">
+              <a:schemeClr val="accent1"/>
+            </a:fillRef>
+            <a:effectRef idx="0">
+              <a:schemeClr val="accent1"/>
+            </a:effectRef>
+            <a:fontRef idx="minor">
+              <a:schemeClr val="lt1"/>
+            </a:fontRef>
+          </p:style>
+          <p:txBody>
+            <a:bodyPr rtlCol="0" anchor="ctr"/>
+            <a:lstStyle/>
+            <a:p>
+              <a:pPr marL="285750" indent="-285750">
+                <a:buFontTx/>
+                <a:buChar char="-"/>
+              </a:pPr>
+              <a:r>
+                <a:rPr lang="fr-FR" dirty="0">
+                  <a:solidFill>
+                    <a:schemeClr val="tx1"/>
+                  </a:solidFill>
+                </a:rPr>
+                <a:t>parallax_path_0</a:t>
+              </a:r>
+            </a:p>
+            <a:p>
+              <a:pPr marL="285750" indent="-285750">
+                <a:buFontTx/>
+                <a:buChar char="-"/>
+              </a:pPr>
+              <a:r>
+                <a:rPr lang="fr-FR" dirty="0">
+                  <a:solidFill>
+                    <a:schemeClr val="tx1"/>
+                  </a:solidFill>
+                </a:rPr>
+                <a:t>parallax_path_1</a:t>
+              </a:r>
+            </a:p>
+            <a:p>
+              <a:pPr marL="285750" indent="-285750">
+                <a:buFontTx/>
+                <a:buChar char="-"/>
+              </a:pPr>
+              <a:r>
+                <a:rPr lang="fr-FR" dirty="0" err="1">
+                  <a:solidFill>
+                    <a:schemeClr val="tx1"/>
+                  </a:solidFill>
+                </a:rPr>
+                <a:t>ethan_description</a:t>
+              </a:r>
+              <a:endParaRPr lang="fr-FR" dirty="0">
+                <a:solidFill>
+                  <a:schemeClr val="tx1"/>
+                </a:solidFill>
+              </a:endParaRPr>
+            </a:p>
+            <a:p>
+              <a:pPr marL="285750" indent="-285750">
+                <a:buFontTx/>
+                <a:buChar char="-"/>
+              </a:pPr>
+              <a:r>
+                <a:rPr lang="fr-FR" dirty="0" err="1">
+                  <a:solidFill>
+                    <a:schemeClr val="tx1"/>
+                  </a:solidFill>
+                </a:rPr>
+                <a:t>noah_description</a:t>
+              </a:r>
+              <a:endParaRPr lang="fr-FR" dirty="0">
+                <a:solidFill>
+                  <a:schemeClr val="tx1"/>
+                </a:solidFill>
+              </a:endParaRPr>
+            </a:p>
+          </p:txBody>
+        </p:sp>
+      </p:grpSp>
     </p:spTree>
     <p:extLst>
       <p:ext uri="{BB962C8B-B14F-4D97-AF65-F5344CB8AC3E}">

</xml_diff>

<commit_message>
Updates all round, buckaroo
</commit_message>
<xml_diff>
--- a/MCD.pptx
+++ b/MCD.pptx
@@ -259,7 +259,7 @@
           <a:p>
             <a:fld id="{1D3AB131-0760-4F5D-A754-5C3545B65AAD}" type="datetimeFigureOut">
               <a:rPr lang="fr-FR" smtClean="0"/>
-              <a:t>29/11/2021</a:t>
+              <a:t>01/12/2021</a:t>
             </a:fld>
             <a:endParaRPr lang="fr-FR"/>
           </a:p>
@@ -457,7 +457,7 @@
           <a:p>
             <a:fld id="{1D3AB131-0760-4F5D-A754-5C3545B65AAD}" type="datetimeFigureOut">
               <a:rPr lang="fr-FR" smtClean="0"/>
-              <a:t>29/11/2021</a:t>
+              <a:t>01/12/2021</a:t>
             </a:fld>
             <a:endParaRPr lang="fr-FR"/>
           </a:p>
@@ -665,7 +665,7 @@
           <a:p>
             <a:fld id="{1D3AB131-0760-4F5D-A754-5C3545B65AAD}" type="datetimeFigureOut">
               <a:rPr lang="fr-FR" smtClean="0"/>
-              <a:t>29/11/2021</a:t>
+              <a:t>01/12/2021</a:t>
             </a:fld>
             <a:endParaRPr lang="fr-FR"/>
           </a:p>
@@ -863,7 +863,7 @@
           <a:p>
             <a:fld id="{1D3AB131-0760-4F5D-A754-5C3545B65AAD}" type="datetimeFigureOut">
               <a:rPr lang="fr-FR" smtClean="0"/>
-              <a:t>29/11/2021</a:t>
+              <a:t>01/12/2021</a:t>
             </a:fld>
             <a:endParaRPr lang="fr-FR"/>
           </a:p>
@@ -1138,7 +1138,7 @@
           <a:p>
             <a:fld id="{1D3AB131-0760-4F5D-A754-5C3545B65AAD}" type="datetimeFigureOut">
               <a:rPr lang="fr-FR" smtClean="0"/>
-              <a:t>29/11/2021</a:t>
+              <a:t>01/12/2021</a:t>
             </a:fld>
             <a:endParaRPr lang="fr-FR"/>
           </a:p>
@@ -1403,7 +1403,7 @@
           <a:p>
             <a:fld id="{1D3AB131-0760-4F5D-A754-5C3545B65AAD}" type="datetimeFigureOut">
               <a:rPr lang="fr-FR" smtClean="0"/>
-              <a:t>29/11/2021</a:t>
+              <a:t>01/12/2021</a:t>
             </a:fld>
             <a:endParaRPr lang="fr-FR"/>
           </a:p>
@@ -1815,7 +1815,7 @@
           <a:p>
             <a:fld id="{1D3AB131-0760-4F5D-A754-5C3545B65AAD}" type="datetimeFigureOut">
               <a:rPr lang="fr-FR" smtClean="0"/>
-              <a:t>29/11/2021</a:t>
+              <a:t>01/12/2021</a:t>
             </a:fld>
             <a:endParaRPr lang="fr-FR"/>
           </a:p>
@@ -1956,7 +1956,7 @@
           <a:p>
             <a:fld id="{1D3AB131-0760-4F5D-A754-5C3545B65AAD}" type="datetimeFigureOut">
               <a:rPr lang="fr-FR" smtClean="0"/>
-              <a:t>29/11/2021</a:t>
+              <a:t>01/12/2021</a:t>
             </a:fld>
             <a:endParaRPr lang="fr-FR"/>
           </a:p>
@@ -2069,7 +2069,7 @@
           <a:p>
             <a:fld id="{1D3AB131-0760-4F5D-A754-5C3545B65AAD}" type="datetimeFigureOut">
               <a:rPr lang="fr-FR" smtClean="0"/>
-              <a:t>29/11/2021</a:t>
+              <a:t>01/12/2021</a:t>
             </a:fld>
             <a:endParaRPr lang="fr-FR"/>
           </a:p>
@@ -2380,7 +2380,7 @@
           <a:p>
             <a:fld id="{1D3AB131-0760-4F5D-A754-5C3545B65AAD}" type="datetimeFigureOut">
               <a:rPr lang="fr-FR" smtClean="0"/>
-              <a:t>29/11/2021</a:t>
+              <a:t>01/12/2021</a:t>
             </a:fld>
             <a:endParaRPr lang="fr-FR"/>
           </a:p>
@@ -2668,7 +2668,7 @@
           <a:p>
             <a:fld id="{1D3AB131-0760-4F5D-A754-5C3545B65AAD}" type="datetimeFigureOut">
               <a:rPr lang="fr-FR" smtClean="0"/>
-              <a:t>29/11/2021</a:t>
+              <a:t>01/12/2021</a:t>
             </a:fld>
             <a:endParaRPr lang="fr-FR"/>
           </a:p>
@@ -2909,7 +2909,7 @@
           <a:p>
             <a:fld id="{1D3AB131-0760-4F5D-A754-5C3545B65AAD}" type="datetimeFigureOut">
               <a:rPr lang="fr-FR" smtClean="0"/>
-              <a:t>29/11/2021</a:t>
+              <a:t>01/12/2021</a:t>
             </a:fld>
             <a:endParaRPr lang="fr-FR"/>
           </a:p>
@@ -3328,91 +3328,19 @@
       </p:grpSpPr>
       <p:sp>
         <p:nvSpPr>
-          <p:cNvPr id="9" name="Ellipse 8">
-            <a:extLst>
-              <a:ext uri="{FF2B5EF4-FFF2-40B4-BE49-F238E27FC236}">
-                <a16:creationId xmlns:a16="http://schemas.microsoft.com/office/drawing/2014/main" id="{0FB152F4-36C8-4129-B2F4-B10A60A8FEB7}"/>
-              </a:ext>
-            </a:extLst>
-          </p:cNvPr>
-          <p:cNvSpPr/>
+          <p:cNvPr id="17" name="ZoneTexte 16">
+            <a:extLst>
+              <a:ext uri="{FF2B5EF4-FFF2-40B4-BE49-F238E27FC236}">
+                <a16:creationId xmlns:a16="http://schemas.microsoft.com/office/drawing/2014/main" id="{BC13C872-AA74-4AC8-8989-04315D5DE571}"/>
+              </a:ext>
+            </a:extLst>
+          </p:cNvPr>
+          <p:cNvSpPr txBox="1"/>
           <p:nvPr/>
         </p:nvSpPr>
         <p:spPr>
           <a:xfrm>
-            <a:off x="4215740" y="3138054"/>
-            <a:ext cx="1490355" cy="581891"/>
-          </a:xfrm>
-          <a:prstGeom prst="ellipse">
-            <a:avLst/>
-          </a:prstGeom>
-          <a:solidFill>
-            <a:schemeClr val="bg1"/>
-          </a:solidFill>
-          <a:ln>
-            <a:solidFill>
-              <a:schemeClr val="tx1"/>
-            </a:solidFill>
-          </a:ln>
-        </p:spPr>
-        <p:style>
-          <a:lnRef idx="2">
-            <a:schemeClr val="accent1">
-              <a:shade val="50000"/>
-            </a:schemeClr>
-          </a:lnRef>
-          <a:fillRef idx="1">
-            <a:schemeClr val="accent1"/>
-          </a:fillRef>
-          <a:effectRef idx="0">
-            <a:schemeClr val="accent1"/>
-          </a:effectRef>
-          <a:fontRef idx="minor">
-            <a:schemeClr val="lt1"/>
-          </a:fontRef>
-        </p:style>
-        <p:txBody>
-          <a:bodyPr rtlCol="0" anchor="ctr"/>
-          <a:lstStyle/>
-          <a:p>
-            <a:pPr algn="ctr"/>
-            <a:r>
-              <a:rPr lang="fr-FR" sz="1400" dirty="0">
-                <a:solidFill>
-                  <a:schemeClr val="tx1"/>
-                </a:solidFill>
-              </a:rPr>
-              <a:t>HAS /</a:t>
-            </a:r>
-          </a:p>
-          <a:p>
-            <a:pPr algn="ctr"/>
-            <a:r>
-              <a:rPr lang="fr-FR" sz="1400" dirty="0">
-                <a:solidFill>
-                  <a:schemeClr val="tx1"/>
-                </a:solidFill>
-              </a:rPr>
-              <a:t>IS PART OF</a:t>
-            </a:r>
-          </a:p>
-        </p:txBody>
-      </p:sp>
-      <p:sp>
-        <p:nvSpPr>
-          <p:cNvPr id="17" name="ZoneTexte 16">
-            <a:extLst>
-              <a:ext uri="{FF2B5EF4-FFF2-40B4-BE49-F238E27FC236}">
-                <a16:creationId xmlns:a16="http://schemas.microsoft.com/office/drawing/2014/main" id="{BC13C872-AA74-4AC8-8989-04315D5DE571}"/>
-              </a:ext>
-            </a:extLst>
-          </p:cNvPr>
-          <p:cNvSpPr txBox="1"/>
-          <p:nvPr/>
-        </p:nvSpPr>
-        <p:spPr>
-          <a:xfrm>
-            <a:off x="5956595" y="2919125"/>
+            <a:off x="6455854" y="2775140"/>
             <a:ext cx="529312" cy="369332"/>
           </a:xfrm>
           <a:prstGeom prst="rect">
@@ -3867,12 +3795,12 @@
         </p:nvCxnSpPr>
         <p:spPr>
           <a:xfrm rot="10800000" flipV="1">
-            <a:off x="2792680" y="3428999"/>
-            <a:ext cx="1423060" cy="539543"/>
+            <a:off x="2781834" y="3481016"/>
+            <a:ext cx="1423060" cy="602856"/>
           </a:xfrm>
           <a:prstGeom prst="bentConnector3">
             <a:avLst>
-              <a:gd name="adj1" fmla="val 45716"/>
+              <a:gd name="adj1" fmla="val 50000"/>
             </a:avLst>
           </a:prstGeom>
           <a:ln w="12700">
@@ -3896,78 +3824,6 @@
           </a:fontRef>
         </p:style>
       </p:cxnSp>
-      <p:sp>
-        <p:nvSpPr>
-          <p:cNvPr id="26" name="Ellipse 25">
-            <a:extLst>
-              <a:ext uri="{FF2B5EF4-FFF2-40B4-BE49-F238E27FC236}">
-                <a16:creationId xmlns:a16="http://schemas.microsoft.com/office/drawing/2014/main" id="{51ED518C-160E-46B8-B7F9-321F3170A083}"/>
-              </a:ext>
-            </a:extLst>
-          </p:cNvPr>
-          <p:cNvSpPr/>
-          <p:nvPr/>
-        </p:nvSpPr>
-        <p:spPr>
-          <a:xfrm>
-            <a:off x="4215740" y="4952011"/>
-            <a:ext cx="1490355" cy="581891"/>
-          </a:xfrm>
-          <a:prstGeom prst="ellipse">
-            <a:avLst/>
-          </a:prstGeom>
-          <a:solidFill>
-            <a:schemeClr val="bg1"/>
-          </a:solidFill>
-          <a:ln>
-            <a:solidFill>
-              <a:schemeClr val="tx1"/>
-            </a:solidFill>
-          </a:ln>
-        </p:spPr>
-        <p:style>
-          <a:lnRef idx="2">
-            <a:schemeClr val="accent1">
-              <a:shade val="50000"/>
-            </a:schemeClr>
-          </a:lnRef>
-          <a:fillRef idx="1">
-            <a:schemeClr val="accent1"/>
-          </a:fillRef>
-          <a:effectRef idx="0">
-            <a:schemeClr val="accent1"/>
-          </a:effectRef>
-          <a:fontRef idx="minor">
-            <a:schemeClr val="lt1"/>
-          </a:fontRef>
-        </p:style>
-        <p:txBody>
-          <a:bodyPr rtlCol="0" anchor="ctr"/>
-          <a:lstStyle/>
-          <a:p>
-            <a:pPr algn="ctr"/>
-            <a:r>
-              <a:rPr lang="fr-FR" sz="1400" dirty="0">
-                <a:solidFill>
-                  <a:schemeClr val="tx1"/>
-                </a:solidFill>
-              </a:rPr>
-              <a:t>HAS /</a:t>
-            </a:r>
-          </a:p>
-          <a:p>
-            <a:pPr algn="ctr"/>
-            <a:r>
-              <a:rPr lang="fr-FR" sz="1400" dirty="0">
-                <a:solidFill>
-                  <a:schemeClr val="tx1"/>
-                </a:solidFill>
-              </a:rPr>
-              <a:t>IS PART OF</a:t>
-            </a:r>
-          </a:p>
-        </p:txBody>
-      </p:sp>
       <p:cxnSp>
         <p:nvCxnSpPr>
           <p:cNvPr id="27" name="Connecteur : en angle 26">
@@ -3979,14 +3835,14 @@
           </p:cNvPr>
           <p:cNvCxnSpPr>
             <a:cxnSpLocks/>
-            <a:stCxn id="26" idx="2"/>
+            <a:stCxn id="37" idx="2"/>
           </p:cNvCxnSpPr>
           <p:nvPr/>
         </p:nvCxnSpPr>
         <p:spPr>
           <a:xfrm rot="10800000">
             <a:off x="2792682" y="4755073"/>
-            <a:ext cx="1423058" cy="487884"/>
+            <a:ext cx="1423058" cy="487858"/>
           </a:xfrm>
           <a:prstGeom prst="bentConnector3">
             <a:avLst/>
@@ -4061,10 +3917,10 @@
         </p:nvGrpSpPr>
         <p:grpSpPr>
           <a:xfrm>
-            <a:off x="6485907" y="2164825"/>
-            <a:ext cx="2558142" cy="1946457"/>
+            <a:off x="7083315" y="1859702"/>
+            <a:ext cx="2558142" cy="2259782"/>
             <a:chOff x="1349828" y="185359"/>
-            <a:chExt cx="1757548" cy="1720629"/>
+            <a:chExt cx="1757548" cy="1997602"/>
           </a:xfrm>
         </p:grpSpPr>
         <p:sp>
@@ -4148,7 +4004,7 @@
           <p:spPr>
             <a:xfrm>
               <a:off x="1349828" y="459179"/>
-              <a:ext cx="1757548" cy="1446809"/>
+              <a:ext cx="1757548" cy="1723782"/>
             </a:xfrm>
             <a:prstGeom prst="rect">
               <a:avLst/>
@@ -4194,6 +4050,30 @@
                 </a:rPr>
                 <a:t>id</a:t>
               </a:r>
+              <a:endParaRPr lang="fr-FR" dirty="0">
+                <a:solidFill>
+                  <a:schemeClr val="tx1"/>
+                </a:solidFill>
+              </a:endParaRPr>
+            </a:p>
+            <a:p>
+              <a:pPr marL="285750" indent="-285750">
+                <a:buFontTx/>
+                <a:buChar char="-"/>
+              </a:pPr>
+              <a:r>
+                <a:rPr lang="fr-FR" dirty="0" err="1">
+                  <a:solidFill>
+                    <a:schemeClr val="tx1"/>
+                  </a:solidFill>
+                </a:rPr>
+                <a:t>project_id</a:t>
+              </a:r>
+              <a:endParaRPr lang="fr-FR" dirty="0">
+                <a:solidFill>
+                  <a:schemeClr val="tx1"/>
+                </a:solidFill>
+              </a:endParaRPr>
             </a:p>
             <a:p>
               <a:pPr marL="285750" indent="-285750">
@@ -4234,6 +4114,25 @@
                 <a:buChar char="-"/>
               </a:pPr>
               <a:r>
+                <a:rPr lang="fr-FR" dirty="0" err="1">
+                  <a:solidFill>
+                    <a:schemeClr val="tx1"/>
+                  </a:solidFill>
+                </a:rPr>
+                <a:t>square_image</a:t>
+              </a:r>
+              <a:endParaRPr lang="fr-FR" dirty="0">
+                <a:solidFill>
+                  <a:schemeClr val="tx1"/>
+                </a:solidFill>
+              </a:endParaRPr>
+            </a:p>
+            <a:p>
+              <a:pPr marL="285750" indent="-285750">
+                <a:buFontTx/>
+                <a:buChar char="-"/>
+              </a:pPr>
+              <a:r>
                 <a:rPr lang="fr-FR" dirty="0">
                   <a:solidFill>
                     <a:schemeClr val="tx1"/>
@@ -4263,12 +4162,12 @@
         </p:nvCxnSpPr>
         <p:spPr>
           <a:xfrm flipV="1">
-            <a:off x="5706095" y="3292933"/>
-            <a:ext cx="779812" cy="136067"/>
+            <a:off x="5695249" y="3144472"/>
+            <a:ext cx="1388066" cy="336544"/>
           </a:xfrm>
           <a:prstGeom prst="bentConnector3">
             <a:avLst>
-              <a:gd name="adj1" fmla="val 35533"/>
+              <a:gd name="adj1" fmla="val 50000"/>
             </a:avLst>
           </a:prstGeom>
           <a:ln w="12700">
@@ -4306,7 +4205,7 @@
         </p:nvGrpSpPr>
         <p:grpSpPr>
           <a:xfrm>
-            <a:off x="6477495" y="4555824"/>
+            <a:off x="7083315" y="4480052"/>
             <a:ext cx="2558142" cy="1946457"/>
             <a:chOff x="1349828" y="185359"/>
             <a:chExt cx="1757548" cy="1720629"/>
@@ -4501,19 +4400,19 @@
           </p:cNvPr>
           <p:cNvCxnSpPr>
             <a:cxnSpLocks/>
-            <a:stCxn id="26" idx="6"/>
+            <a:stCxn id="37" idx="6"/>
             <a:endCxn id="43" idx="1"/>
           </p:cNvCxnSpPr>
           <p:nvPr/>
         </p:nvCxnSpPr>
         <p:spPr>
           <a:xfrm>
-            <a:off x="5706095" y="5242957"/>
-            <a:ext cx="771400" cy="440975"/>
+            <a:off x="5706095" y="5242931"/>
+            <a:ext cx="1377220" cy="365229"/>
           </a:xfrm>
           <a:prstGeom prst="bentConnector3">
             <a:avLst>
-              <a:gd name="adj1" fmla="val 32296"/>
+              <a:gd name="adj1" fmla="val 50000"/>
             </a:avLst>
           </a:prstGeom>
           <a:ln w="12700">
@@ -4551,7 +4450,7 @@
         </p:nvSpPr>
         <p:spPr>
           <a:xfrm>
-            <a:off x="5918992" y="5705604"/>
+            <a:off x="6455854" y="5648002"/>
             <a:ext cx="529312" cy="369332"/>
           </a:xfrm>
           <a:prstGeom prst="rect">
@@ -4774,6 +4673,280 @@
             </a:p>
           </p:txBody>
         </p:sp>
+      </p:grpSp>
+      <p:grpSp>
+        <p:nvGrpSpPr>
+          <p:cNvPr id="15" name="Groupe 14">
+            <a:extLst>
+              <a:ext uri="{FF2B5EF4-FFF2-40B4-BE49-F238E27FC236}">
+                <a16:creationId xmlns:a16="http://schemas.microsoft.com/office/drawing/2014/main" id="{53576209-391E-4835-BDB2-17BC2463D9F1}"/>
+              </a:ext>
+            </a:extLst>
+          </p:cNvPr>
+          <p:cNvGrpSpPr/>
+          <p:nvPr/>
+        </p:nvGrpSpPr>
+        <p:grpSpPr>
+          <a:xfrm>
+            <a:off x="4204894" y="3126755"/>
+            <a:ext cx="1490355" cy="708521"/>
+            <a:chOff x="4204894" y="3126755"/>
+            <a:chExt cx="1490355" cy="708521"/>
+          </a:xfrm>
+        </p:grpSpPr>
+        <p:sp>
+          <p:nvSpPr>
+            <p:cNvPr id="9" name="Ellipse 8">
+              <a:extLst>
+                <a:ext uri="{FF2B5EF4-FFF2-40B4-BE49-F238E27FC236}">
+                  <a16:creationId xmlns:a16="http://schemas.microsoft.com/office/drawing/2014/main" id="{0FB152F4-36C8-4129-B2F4-B10A60A8FEB7}"/>
+                </a:ext>
+              </a:extLst>
+            </p:cNvPr>
+            <p:cNvSpPr/>
+            <p:nvPr/>
+          </p:nvSpPr>
+          <p:spPr>
+            <a:xfrm>
+              <a:off x="4204894" y="3126755"/>
+              <a:ext cx="1490355" cy="708521"/>
+            </a:xfrm>
+            <a:prstGeom prst="ellipse">
+              <a:avLst/>
+            </a:prstGeom>
+            <a:solidFill>
+              <a:schemeClr val="bg1"/>
+            </a:solidFill>
+            <a:ln>
+              <a:solidFill>
+                <a:schemeClr val="tx1"/>
+              </a:solidFill>
+            </a:ln>
+          </p:spPr>
+          <p:style>
+            <a:lnRef idx="2">
+              <a:schemeClr val="accent1">
+                <a:shade val="50000"/>
+              </a:schemeClr>
+            </a:lnRef>
+            <a:fillRef idx="1">
+              <a:schemeClr val="accent1"/>
+            </a:fillRef>
+            <a:effectRef idx="0">
+              <a:schemeClr val="accent1"/>
+            </a:effectRef>
+            <a:fontRef idx="minor">
+              <a:schemeClr val="lt1"/>
+            </a:fontRef>
+          </p:style>
+          <p:txBody>
+            <a:bodyPr rtlCol="0" anchor="ctr"/>
+            <a:lstStyle/>
+            <a:p>
+              <a:pPr algn="ctr"/>
+              <a:r>
+                <a:rPr lang="fr-FR" sz="1400" dirty="0">
+                  <a:solidFill>
+                    <a:schemeClr val="tx1"/>
+                  </a:solidFill>
+                </a:rPr>
+                <a:t>HAS</a:t>
+              </a:r>
+            </a:p>
+            <a:p>
+              <a:pPr algn="ctr"/>
+              <a:r>
+                <a:rPr lang="fr-FR" sz="1400" dirty="0">
+                  <a:solidFill>
+                    <a:schemeClr val="tx1"/>
+                  </a:solidFill>
+                </a:rPr>
+                <a:t>IS PART OF</a:t>
+              </a:r>
+            </a:p>
+          </p:txBody>
+        </p:sp>
+        <p:cxnSp>
+          <p:nvCxnSpPr>
+            <p:cNvPr id="10" name="Connecteur droit 9">
+              <a:extLst>
+                <a:ext uri="{FF2B5EF4-FFF2-40B4-BE49-F238E27FC236}">
+                  <a16:creationId xmlns:a16="http://schemas.microsoft.com/office/drawing/2014/main" id="{BD8EDFA2-FAD7-4DDB-BC95-BEA6490F7DBB}"/>
+                </a:ext>
+              </a:extLst>
+            </p:cNvPr>
+            <p:cNvCxnSpPr>
+              <a:stCxn id="9" idx="2"/>
+              <a:endCxn id="9" idx="6"/>
+            </p:cNvCxnSpPr>
+            <p:nvPr/>
+          </p:nvCxnSpPr>
+          <p:spPr>
+            <a:xfrm>
+              <a:off x="4204894" y="3481016"/>
+              <a:ext cx="1490355" cy="0"/>
+            </a:xfrm>
+            <a:prstGeom prst="line">
+              <a:avLst/>
+            </a:prstGeom>
+            <a:ln w="12700">
+              <a:solidFill>
+                <a:schemeClr val="tx1"/>
+              </a:solidFill>
+            </a:ln>
+          </p:spPr>
+          <p:style>
+            <a:lnRef idx="1">
+              <a:schemeClr val="dk1"/>
+            </a:lnRef>
+            <a:fillRef idx="0">
+              <a:schemeClr val="dk1"/>
+            </a:fillRef>
+            <a:effectRef idx="0">
+              <a:schemeClr val="dk1"/>
+            </a:effectRef>
+            <a:fontRef idx="minor">
+              <a:schemeClr val="tx1"/>
+            </a:fontRef>
+          </p:style>
+        </p:cxnSp>
+      </p:grpSp>
+      <p:grpSp>
+        <p:nvGrpSpPr>
+          <p:cNvPr id="36" name="Groupe 35">
+            <a:extLst>
+              <a:ext uri="{FF2B5EF4-FFF2-40B4-BE49-F238E27FC236}">
+                <a16:creationId xmlns:a16="http://schemas.microsoft.com/office/drawing/2014/main" id="{45726D69-FEAA-4813-80AA-8ED2437934C6}"/>
+              </a:ext>
+            </a:extLst>
+          </p:cNvPr>
+          <p:cNvGrpSpPr/>
+          <p:nvPr/>
+        </p:nvGrpSpPr>
+        <p:grpSpPr>
+          <a:xfrm>
+            <a:off x="4215740" y="4888670"/>
+            <a:ext cx="1490355" cy="708521"/>
+            <a:chOff x="4204894" y="3126755"/>
+            <a:chExt cx="1490355" cy="708521"/>
+          </a:xfrm>
+        </p:grpSpPr>
+        <p:sp>
+          <p:nvSpPr>
+            <p:cNvPr id="37" name="Ellipse 36">
+              <a:extLst>
+                <a:ext uri="{FF2B5EF4-FFF2-40B4-BE49-F238E27FC236}">
+                  <a16:creationId xmlns:a16="http://schemas.microsoft.com/office/drawing/2014/main" id="{0972150D-E3F3-41BD-B330-C9111D3C2AC1}"/>
+                </a:ext>
+              </a:extLst>
+            </p:cNvPr>
+            <p:cNvSpPr/>
+            <p:nvPr/>
+          </p:nvSpPr>
+          <p:spPr>
+            <a:xfrm>
+              <a:off x="4204894" y="3126755"/>
+              <a:ext cx="1490355" cy="708521"/>
+            </a:xfrm>
+            <a:prstGeom prst="ellipse">
+              <a:avLst/>
+            </a:prstGeom>
+            <a:solidFill>
+              <a:schemeClr val="bg1"/>
+            </a:solidFill>
+            <a:ln>
+              <a:solidFill>
+                <a:schemeClr val="tx1"/>
+              </a:solidFill>
+            </a:ln>
+          </p:spPr>
+          <p:style>
+            <a:lnRef idx="2">
+              <a:schemeClr val="accent1">
+                <a:shade val="50000"/>
+              </a:schemeClr>
+            </a:lnRef>
+            <a:fillRef idx="1">
+              <a:schemeClr val="accent1"/>
+            </a:fillRef>
+            <a:effectRef idx="0">
+              <a:schemeClr val="accent1"/>
+            </a:effectRef>
+            <a:fontRef idx="minor">
+              <a:schemeClr val="lt1"/>
+            </a:fontRef>
+          </p:style>
+          <p:txBody>
+            <a:bodyPr rtlCol="0" anchor="ctr"/>
+            <a:lstStyle/>
+            <a:p>
+              <a:pPr algn="ctr"/>
+              <a:r>
+                <a:rPr lang="fr-FR" sz="1400" dirty="0">
+                  <a:solidFill>
+                    <a:schemeClr val="tx1"/>
+                  </a:solidFill>
+                </a:rPr>
+                <a:t>HAS</a:t>
+              </a:r>
+            </a:p>
+            <a:p>
+              <a:pPr algn="ctr"/>
+              <a:r>
+                <a:rPr lang="fr-FR" sz="1400" dirty="0">
+                  <a:solidFill>
+                    <a:schemeClr val="tx1"/>
+                  </a:solidFill>
+                </a:rPr>
+                <a:t>IS PART OF</a:t>
+              </a:r>
+            </a:p>
+          </p:txBody>
+        </p:sp>
+        <p:cxnSp>
+          <p:nvCxnSpPr>
+            <p:cNvPr id="38" name="Connecteur droit 37">
+              <a:extLst>
+                <a:ext uri="{FF2B5EF4-FFF2-40B4-BE49-F238E27FC236}">
+                  <a16:creationId xmlns:a16="http://schemas.microsoft.com/office/drawing/2014/main" id="{93E81DD9-893F-49C8-BE6B-1BA702BC5F18}"/>
+                </a:ext>
+              </a:extLst>
+            </p:cNvPr>
+            <p:cNvCxnSpPr>
+              <a:stCxn id="37" idx="2"/>
+              <a:endCxn id="37" idx="6"/>
+            </p:cNvCxnSpPr>
+            <p:nvPr/>
+          </p:nvCxnSpPr>
+          <p:spPr>
+            <a:xfrm>
+              <a:off x="4204894" y="3481016"/>
+              <a:ext cx="1490355" cy="0"/>
+            </a:xfrm>
+            <a:prstGeom prst="line">
+              <a:avLst/>
+            </a:prstGeom>
+            <a:ln w="12700">
+              <a:solidFill>
+                <a:schemeClr val="tx1"/>
+              </a:solidFill>
+            </a:ln>
+          </p:spPr>
+          <p:style>
+            <a:lnRef idx="1">
+              <a:schemeClr val="dk1"/>
+            </a:lnRef>
+            <a:fillRef idx="0">
+              <a:schemeClr val="dk1"/>
+            </a:fillRef>
+            <a:effectRef idx="0">
+              <a:schemeClr val="dk1"/>
+            </a:effectRef>
+            <a:fontRef idx="minor">
+              <a:schemeClr val="tx1"/>
+            </a:fontRef>
+          </p:style>
+        </p:cxnSp>
       </p:grpSp>
     </p:spTree>
     <p:extLst>

</xml_diff>